<commit_message>
emove the notion of pre-installed applications in overview
this is not important at this step. It is explained further in the
Virtual Device builder.
</commit_message>
<xml_diff>
--- a/KernelDeveloperGuide/pptx/build_flow_kernel.pptx
+++ b/KernelDeveloperGuide/pptx/build_flow_kernel.pptx
@@ -4509,48 +4509,6 @@
       </p:grpSpPr>
       <p:sp>
         <p:nvSpPr>
-          <p:cNvPr id="11" name="Rounded Rectangle 10"/>
-          <p:cNvSpPr/>
-          <p:nvPr/>
-        </p:nvSpPr>
-        <p:spPr>
-          <a:xfrm>
-            <a:off x="5715073" y="2085369"/>
-            <a:ext cx="1331416" cy="406125"/>
-          </a:xfrm>
-          <a:prstGeom prst="roundRect">
-            <a:avLst/>
-          </a:prstGeom>
-          <a:ln/>
-        </p:spPr>
-        <p:style>
-          <a:lnRef idx="2">
-            <a:schemeClr val="dk1"/>
-          </a:lnRef>
-          <a:fillRef idx="1">
-            <a:schemeClr val="lt1"/>
-          </a:fillRef>
-          <a:effectRef idx="0">
-            <a:schemeClr val="dk1"/>
-          </a:effectRef>
-          <a:fontRef idx="minor">
-            <a:schemeClr val="dk1"/>
-          </a:fontRef>
-        </p:style>
-        <p:txBody>
-          <a:bodyPr rtlCol="0" anchor="ctr"/>
-          <a:lstStyle/>
-          <a:p>
-            <a:pPr algn="ctr"/>
-            <a:r>
-              <a:rPr lang="en-US" sz="1200" dirty="0" smtClean="0"/>
-              <a:t>Application 1</a:t>
-            </a:r>
-          </a:p>
-        </p:txBody>
-      </p:sp>
-      <p:sp>
-        <p:nvSpPr>
           <p:cNvPr id="20" name="Down Arrow 19"/>
           <p:cNvSpPr/>
           <p:nvPr/>
@@ -4633,13 +4591,8 @@
             </a:r>
             <a:r>
               <a:rPr lang="en-US" sz="1200" dirty="0" smtClean="0"/>
-              <a:t>EE </a:t>
-            </a:r>
-            <a:r>
-              <a:rPr lang="en-US" sz="1200" dirty="0" smtClean="0"/>
-              <a:t>Port</a:t>
-            </a:r>
-            <a:endParaRPr lang="en-US" sz="1200" dirty="0" smtClean="0"/>
+              <a:t>EE Port</a:t>
+            </a:r>
           </a:p>
         </p:txBody>
       </p:sp>
@@ -4773,56 +4726,14 @@
       </p:sp>
       <p:sp>
         <p:nvSpPr>
-          <p:cNvPr id="72" name="Rounded Rectangle 71"/>
+          <p:cNvPr id="32" name="Down Arrow 31"/>
           <p:cNvSpPr/>
           <p:nvPr/>
         </p:nvSpPr>
         <p:spPr>
           <a:xfrm>
-            <a:off x="6066885" y="2436717"/>
-            <a:ext cx="1331416" cy="422899"/>
-          </a:xfrm>
-          <a:prstGeom prst="roundRect">
-            <a:avLst/>
-          </a:prstGeom>
-          <a:ln/>
-        </p:spPr>
-        <p:style>
-          <a:lnRef idx="2">
-            <a:schemeClr val="dk1"/>
-          </a:lnRef>
-          <a:fillRef idx="1">
-            <a:schemeClr val="lt1"/>
-          </a:fillRef>
-          <a:effectRef idx="0">
-            <a:schemeClr val="dk1"/>
-          </a:effectRef>
-          <a:fontRef idx="minor">
-            <a:schemeClr val="dk1"/>
-          </a:fontRef>
-        </p:style>
-        <p:txBody>
-          <a:bodyPr rtlCol="0" anchor="ctr"/>
-          <a:lstStyle/>
-          <a:p>
-            <a:pPr algn="ctr"/>
-            <a:r>
-              <a:rPr lang="en-US" sz="1200" dirty="0" smtClean="0"/>
-              <a:t>Application N</a:t>
-            </a:r>
-          </a:p>
-        </p:txBody>
-      </p:sp>
-      <p:sp>
-        <p:nvSpPr>
-          <p:cNvPr id="31" name="Down Arrow 30"/>
-          <p:cNvSpPr/>
-          <p:nvPr/>
-        </p:nvSpPr>
-        <p:spPr>
-          <a:xfrm rot="5400000" flipH="1">
-            <a:off x="5344138" y="2111288"/>
-            <a:ext cx="165213" cy="451219"/>
+            <a:off x="4427984" y="1380273"/>
+            <a:ext cx="167575" cy="357510"/>
           </a:xfrm>
           <a:prstGeom prst="downArrow">
             <a:avLst/>
@@ -4858,49 +4769,6 @@
       </p:sp>
       <p:sp>
         <p:nvSpPr>
-          <p:cNvPr id="32" name="Down Arrow 31"/>
-          <p:cNvSpPr/>
-          <p:nvPr/>
-        </p:nvSpPr>
-        <p:spPr>
-          <a:xfrm>
-            <a:off x="4427984" y="1380273"/>
-            <a:ext cx="167575" cy="357510"/>
-          </a:xfrm>
-          <a:prstGeom prst="downArrow">
-            <a:avLst/>
-          </a:prstGeom>
-          <a:ln>
-            <a:noFill/>
-          </a:ln>
-        </p:spPr>
-        <p:style>
-          <a:lnRef idx="2">
-            <a:schemeClr val="accent1">
-              <a:shade val="50000"/>
-            </a:schemeClr>
-          </a:lnRef>
-          <a:fillRef idx="1">
-            <a:schemeClr val="accent1"/>
-          </a:fillRef>
-          <a:effectRef idx="0">
-            <a:schemeClr val="accent1"/>
-          </a:effectRef>
-          <a:fontRef idx="minor">
-            <a:schemeClr val="lt1"/>
-          </a:fontRef>
-        </p:style>
-        <p:txBody>
-          <a:bodyPr rtlCol="0" anchor="ctr"/>
-          <a:lstStyle/>
-          <a:p>
-            <a:pPr algn="ctr"/>
-            <a:endParaRPr lang="en-US"/>
-          </a:p>
-        </p:txBody>
-      </p:sp>
-      <p:sp>
-        <p:nvSpPr>
           <p:cNvPr id="34" name="Rounded Rectangle 33"/>
           <p:cNvSpPr/>
           <p:nvPr/>
@@ -5198,78 +5066,6 @@
       </p:sp>
       <p:sp>
         <p:nvSpPr>
-          <p:cNvPr id="22" name="Rectangle 21"/>
-          <p:cNvSpPr/>
-          <p:nvPr/>
-        </p:nvSpPr>
-        <p:spPr>
-          <a:xfrm>
-            <a:off x="5681039" y="1839148"/>
-            <a:ext cx="1915297" cy="1078497"/>
-          </a:xfrm>
-          <a:prstGeom prst="rect">
-            <a:avLst/>
-          </a:prstGeom>
-          <a:ln w="6350">
-            <a:prstDash val="dash"/>
-            <a:headEnd type="none" w="med" len="med"/>
-            <a:tailEnd type="arrow" w="med" len="med"/>
-          </a:ln>
-        </p:spPr>
-        <p:style>
-          <a:lnRef idx="1">
-            <a:schemeClr val="accent1"/>
-          </a:lnRef>
-          <a:fillRef idx="0">
-            <a:schemeClr val="accent1"/>
-          </a:fillRef>
-          <a:effectRef idx="0">
-            <a:schemeClr val="accent1"/>
-          </a:effectRef>
-          <a:fontRef idx="minor">
-            <a:schemeClr val="tx1"/>
-          </a:fontRef>
-        </p:style>
-        <p:txBody>
-          <a:bodyPr rtlCol="0" anchor="ctr"/>
-          <a:lstStyle/>
-          <a:p>
-            <a:pPr algn="ctr"/>
-            <a:endParaRPr lang="en-US"/>
-          </a:p>
-        </p:txBody>
-      </p:sp>
-      <p:sp>
-        <p:nvSpPr>
-          <p:cNvPr id="23" name="Rectangle 22"/>
-          <p:cNvSpPr/>
-          <p:nvPr/>
-        </p:nvSpPr>
-        <p:spPr>
-          <a:xfrm>
-            <a:off x="6161159" y="1789798"/>
-            <a:ext cx="1463862" cy="246221"/>
-          </a:xfrm>
-          <a:prstGeom prst="rect">
-            <a:avLst/>
-          </a:prstGeom>
-        </p:spPr>
-        <p:txBody>
-          <a:bodyPr wrap="none">
-            <a:spAutoFit/>
-          </a:bodyPr>
-          <a:lstStyle/>
-          <a:p>
-            <a:r>
-              <a:rPr lang="en-US" sz="1000" b="1" dirty="0" smtClean="0"/>
-              <a:t>Pre-installed Applications</a:t>
-            </a:r>
-            <a:endParaRPr lang="en-US" sz="1000" b="1" dirty="0"/>
-          </a:p>
-        </p:txBody>
-      </p:sp>
-      <p:sp>
-        <p:nvSpPr>
           <p:cNvPr id="24" name="Rounded Rectangle 23"/>
           <p:cNvSpPr/>
           <p:nvPr/>
@@ -5305,11 +5101,7 @@
             <a:pPr algn="ctr"/>
             <a:r>
               <a:rPr lang="en-US" sz="1200" dirty="0" smtClean="0"/>
-              <a:t>Kernel </a:t>
-            </a:r>
-            <a:r>
-              <a:rPr lang="en-US" sz="1200" dirty="0" smtClean="0"/>
-              <a:t>binary</a:t>
+              <a:t>Kernel binary</a:t>
             </a:r>
           </a:p>
           <a:p>
@@ -5318,7 +5110,6 @@
               <a:rPr lang="en-US" sz="1000" dirty="0" smtClean="0"/>
               <a:t>(ELF executable)</a:t>
             </a:r>
-            <a:endParaRPr lang="en-US" sz="1000" dirty="0" smtClean="0"/>
           </a:p>
         </p:txBody>
       </p:sp>

</xml_diff>